<commit_message>
update lecture2,lecture5 and add lecture6
</commit_message>
<xml_diff>
--- a/Lecture05/Python新手的第一堂实战课-第五讲-查永春.pptx
+++ b/Lecture05/Python新手的第一堂实战课-第五讲-查永春.pptx
@@ -5,10 +5,10 @@
     <p:sldMasterId id="2147483648" r:id="rId1"/>
   </p:sldMasterIdLst>
   <p:notesMasterIdLst>
-    <p:notesMasterId r:id="rId12"/>
+    <p:notesMasterId r:id="rId11"/>
   </p:notesMasterIdLst>
   <p:handoutMasterIdLst>
-    <p:handoutMasterId r:id="rId13"/>
+    <p:handoutMasterId r:id="rId12"/>
   </p:handoutMasterIdLst>
   <p:sldIdLst>
     <p:sldId id="3205" r:id="rId2"/>
@@ -19,8 +19,7 @@
     <p:sldId id="3372" r:id="rId7"/>
     <p:sldId id="3414" r:id="rId8"/>
     <p:sldId id="3373" r:id="rId9"/>
-    <p:sldId id="3415" r:id="rId10"/>
-    <p:sldId id="3323" r:id="rId11"/>
+    <p:sldId id="3323" r:id="rId10"/>
   </p:sldIdLst>
   <p:sldSz cx="12858750" cy="7232650"/>
   <p:notesSz cx="6858000" cy="9144000"/>
@@ -278,7 +277,7 @@
           <a:p>
             <a:fld id="{717742FC-62BB-4B81-9CA5-3B750A4B4580}" type="datetimeFigureOut">
               <a:rPr lang="zh-CN" altLang="en-US" smtClean="0"/>
-              <a:t>2019/12/30</a:t>
+              <a:t>2020/4/11</a:t>
             </a:fld>
             <a:endParaRPr lang="zh-CN" altLang="en-US"/>
           </a:p>
@@ -444,7 +443,7 @@
             </a:pPr>
             <a:fld id="{06024D97-E667-405D-B634-E583E2108D71}" type="datetimeFigureOut">
               <a:rPr lang="zh-CN" altLang="en-US"/>
-              <a:t>2019/12/30</a:t>
+              <a:t>2020/4/11</a:t>
             </a:fld>
             <a:endParaRPr lang="zh-CN" altLang="en-US"/>
           </a:p>
@@ -824,85 +823,6 @@
 </p:notes>
 </file>
 
-<file path=ppt/notesSlides/notesSlide10.xml><?xml version="1.0" encoding="utf-8"?>
-<p:notes xmlns:a="http://schemas.openxmlformats.org/drawingml/2006/main" xmlns:r="http://schemas.openxmlformats.org/officeDocument/2006/relationships" xmlns:p="http://schemas.openxmlformats.org/presentationml/2006/main">
-  <p:cSld>
-    <p:spTree>
-      <p:nvGrpSpPr>
-        <p:cNvPr id="1" name=""/>
-        <p:cNvGrpSpPr/>
-        <p:nvPr/>
-      </p:nvGrpSpPr>
-      <p:grpSpPr>
-        <a:xfrm>
-          <a:off x="0" y="0"/>
-          <a:ext cx="0" cy="0"/>
-          <a:chOff x="0" y="0"/>
-          <a:chExt cx="0" cy="0"/>
-        </a:xfrm>
-      </p:grpSpPr>
-      <p:sp>
-        <p:nvSpPr>
-          <p:cNvPr id="2" name="幻灯片图像占位符 1"/>
-          <p:cNvSpPr>
-            <a:spLocks noGrp="1" noRot="1" noChangeAspect="1"/>
-          </p:cNvSpPr>
-          <p:nvPr>
-            <p:ph type="sldImg"/>
-          </p:nvPr>
-        </p:nvSpPr>
-        <p:spPr/>
-      </p:sp>
-      <p:sp>
-        <p:nvSpPr>
-          <p:cNvPr id="3" name="备注占位符 2"/>
-          <p:cNvSpPr>
-            <a:spLocks noGrp="1"/>
-          </p:cNvSpPr>
-          <p:nvPr>
-            <p:ph type="body" idx="1"/>
-          </p:nvPr>
-        </p:nvSpPr>
-        <p:spPr/>
-        <p:txBody>
-          <a:bodyPr/>
-          <a:lstStyle/>
-          <a:p>
-            <a:endParaRPr lang="zh-CN" altLang="en-US"/>
-          </a:p>
-        </p:txBody>
-      </p:sp>
-      <p:sp>
-        <p:nvSpPr>
-          <p:cNvPr id="4" name="灯片编号占位符 3"/>
-          <p:cNvSpPr>
-            <a:spLocks noGrp="1"/>
-          </p:cNvSpPr>
-          <p:nvPr>
-            <p:ph type="sldNum" sz="quarter" idx="10"/>
-          </p:nvPr>
-        </p:nvSpPr>
-        <p:spPr/>
-        <p:txBody>
-          <a:bodyPr/>
-          <a:lstStyle/>
-          <a:p>
-            <a:fld id="{418F03C3-53C1-4F10-8DAF-D1F318E96C6E}" type="slidenum">
-              <a:rPr lang="zh-CN" altLang="en-US" smtClean="0"/>
-              <a:t>10</a:t>
-            </a:fld>
-            <a:endParaRPr lang="zh-CN" altLang="en-US"/>
-          </a:p>
-        </p:txBody>
-      </p:sp>
-    </p:spTree>
-  </p:cSld>
-  <p:clrMapOvr>
-    <a:masterClrMapping/>
-  </p:clrMapOvr>
-</p:notes>
-</file>
-
 <file path=ppt/notesSlides/notesSlide2.xml><?xml version="1.0" encoding="utf-8"?>
 <p:notes xmlns:a="http://schemas.openxmlformats.org/drawingml/2006/main" xmlns:r="http://schemas.openxmlformats.org/officeDocument/2006/relationships" xmlns:p="http://schemas.openxmlformats.org/presentationml/2006/main">
   <p:cSld>
@@ -1554,7 +1474,7 @@
           <a:bodyPr/>
           <a:lstStyle/>
           <a:p>
-            <a:fld id="{C07390C9-E209-452A-AF2C-23D0DB5DF8D6}" type="slidenum">
+            <a:fld id="{418F03C3-53C1-4F10-8DAF-D1F318E96C6E}" type="slidenum">
               <a:rPr lang="zh-CN" altLang="en-US" smtClean="0"/>
               <a:t>9</a:t>
             </a:fld>
@@ -1563,11 +1483,6 @@
         </p:txBody>
       </p:sp>
     </p:spTree>
-    <p:extLst>
-      <p:ext uri="{BB962C8B-B14F-4D97-AF65-F5344CB8AC3E}">
-        <p14:creationId xmlns:p14="http://schemas.microsoft.com/office/powerpoint/2010/main" val="1146889585"/>
-      </p:ext>
-    </p:extLst>
   </p:cSld>
   <p:clrMapOvr>
     <a:masterClrMapping/>
@@ -1762,7 +1677,7 @@
           <a:p>
             <a:fld id="{43A93E93-166D-47F5-9EF1-ACEABE24AEEA}" type="datetimeFigureOut">
               <a:rPr lang="zh-CN" altLang="en-US" smtClean="0"/>
-              <a:t>2019/12/30</a:t>
+              <a:t>2020/4/11</a:t>
             </a:fld>
             <a:endParaRPr lang="zh-CN" altLang="en-US"/>
           </a:p>
@@ -3123,180 +3038,6 @@
 </p:sld>
 </file>
 
-<file path=ppt/slides/slide10.xml><?xml version="1.0" encoding="utf-8"?>
-<p:sld xmlns:a="http://schemas.openxmlformats.org/drawingml/2006/main" xmlns:r="http://schemas.openxmlformats.org/officeDocument/2006/relationships" xmlns:p="http://schemas.openxmlformats.org/presentationml/2006/main">
-  <p:cSld>
-    <p:spTree>
-      <p:nvGrpSpPr>
-        <p:cNvPr id="1" name=""/>
-        <p:cNvGrpSpPr/>
-        <p:nvPr/>
-      </p:nvGrpSpPr>
-      <p:grpSpPr>
-        <a:xfrm>
-          <a:off x="0" y="0"/>
-          <a:ext cx="0" cy="0"/>
-          <a:chOff x="0" y="0"/>
-          <a:chExt cx="0" cy="0"/>
-        </a:xfrm>
-      </p:grpSpPr>
-      <p:sp>
-        <p:nvSpPr>
-          <p:cNvPr id="63" name="TextBox 10"/>
-          <p:cNvSpPr txBox="1"/>
-          <p:nvPr/>
-        </p:nvSpPr>
-        <p:spPr>
-          <a:xfrm>
-            <a:off x="3417022" y="5559540"/>
-            <a:ext cx="6024711" cy="900238"/>
-          </a:xfrm>
-          <a:prstGeom prst="rect">
-            <a:avLst/>
-          </a:prstGeom>
-          <a:noFill/>
-        </p:spPr>
-        <p:txBody>
-          <a:bodyPr wrap="none" lIns="68572" tIns="34286" rIns="68572" bIns="34286">
-            <a:spAutoFit/>
-          </a:bodyPr>
-          <a:lstStyle/>
-          <a:p>
-            <a:pPr algn="ctr">
-              <a:buNone/>
-            </a:pPr>
-            <a:r>
-              <a:rPr lang="zh-CN" altLang="en-US" sz="5400" dirty="0">
-                <a:solidFill>
-                  <a:schemeClr val="accent1"/>
-                </a:solidFill>
-                <a:latin typeface="黑体" panose="02010609060101010101" pitchFamily="49" charset="-122"/>
-                <a:ea typeface="黑体" panose="02010609060101010101" pitchFamily="49" charset="-122"/>
-                <a:cs typeface="Arial" panose="020B0604020202020204" pitchFamily="34" charset="0"/>
-              </a:rPr>
-              <a:t>感谢聆听 批评指导</a:t>
-            </a:r>
-          </a:p>
-        </p:txBody>
-      </p:sp>
-      <p:sp>
-        <p:nvSpPr>
-          <p:cNvPr id="71" name="矩形 70"/>
-          <p:cNvSpPr/>
-          <p:nvPr/>
-        </p:nvSpPr>
-        <p:spPr>
-          <a:xfrm>
-            <a:off x="3945101" y="6496645"/>
-            <a:ext cx="4968552" cy="315463"/>
-          </a:xfrm>
-          <a:prstGeom prst="rect">
-            <a:avLst/>
-          </a:prstGeom>
-        </p:spPr>
-        <p:txBody>
-          <a:bodyPr wrap="square" lIns="68572" tIns="34286" rIns="68572" bIns="34286">
-            <a:spAutoFit/>
-          </a:bodyPr>
-          <a:lstStyle/>
-          <a:p>
-            <a:pPr algn="ctr"/>
-            <a:r>
-              <a:rPr lang="en-US" altLang="zh-CN" sz="1600" dirty="0">
-                <a:solidFill>
-                  <a:schemeClr val="accent1"/>
-                </a:solidFill>
-                <a:latin typeface="黑体" panose="02010609060101010101" pitchFamily="49" charset="-122"/>
-                <a:ea typeface="黑体" panose="02010609060101010101" pitchFamily="49" charset="-122"/>
-                <a:cs typeface="Arial" panose="020B0604020202020204" pitchFamily="34" charset="0"/>
-              </a:rPr>
-              <a:t>GENERAL EDUCATION TEACHING COURSEWARE</a:t>
-            </a:r>
-          </a:p>
-        </p:txBody>
-      </p:sp>
-      <p:pic>
-        <p:nvPicPr>
-          <p:cNvPr id="2" name="图片 1"/>
-          <p:cNvPicPr>
-            <a:picLocks noChangeAspect="1"/>
-          </p:cNvPicPr>
-          <p:nvPr/>
-        </p:nvPicPr>
-        <p:blipFill>
-          <a:blip r:embed="rId3">
-            <a:extLst>
-              <a:ext uri="{28A0092B-C50C-407E-A947-70E740481C1C}">
-                <a14:useLocalDpi xmlns:a14="http://schemas.microsoft.com/office/drawing/2010/main" val="0"/>
-              </a:ext>
-            </a:extLst>
-          </a:blip>
-          <a:stretch>
-            <a:fillRect/>
-          </a:stretch>
-        </p:blipFill>
-        <p:spPr>
-          <a:xfrm>
-            <a:off x="4629175" y="1121936"/>
-            <a:ext cx="4112444" cy="4112444"/>
-          </a:xfrm>
-          <a:prstGeom prst="rect">
-            <a:avLst/>
-          </a:prstGeom>
-        </p:spPr>
-      </p:pic>
-      <p:pic>
-        <p:nvPicPr>
-          <p:cNvPr id="4" name="图片 3" descr="卡通人物&#10;&#10;描述已自动生成">
-            <a:extLst>
-              <a:ext uri="{FF2B5EF4-FFF2-40B4-BE49-F238E27FC236}">
-                <a16:creationId xmlns:a16="http://schemas.microsoft.com/office/drawing/2014/main" id="{789E5A49-9892-4544-BCAD-5420FF1F9833}"/>
-              </a:ext>
-            </a:extLst>
-          </p:cNvPr>
-          <p:cNvPicPr>
-            <a:picLocks noChangeAspect="1"/>
-          </p:cNvPicPr>
-          <p:nvPr/>
-        </p:nvPicPr>
-        <p:blipFill>
-          <a:blip r:embed="rId4">
-            <a:extLst>
-              <a:ext uri="{28A0092B-C50C-407E-A947-70E740481C1C}">
-                <a14:useLocalDpi xmlns:a14="http://schemas.microsoft.com/office/drawing/2010/main" val="0"/>
-              </a:ext>
-            </a:extLst>
-          </a:blip>
-          <a:stretch>
-            <a:fillRect/>
-          </a:stretch>
-        </p:blipFill>
-        <p:spPr>
-          <a:xfrm>
-            <a:off x="0" y="87927"/>
-            <a:ext cx="12858750" cy="7056796"/>
-          </a:xfrm>
-          <a:prstGeom prst="rect">
-            <a:avLst/>
-          </a:prstGeom>
-        </p:spPr>
-      </p:pic>
-    </p:spTree>
-  </p:cSld>
-  <p:clrMapOvr>
-    <a:masterClrMapping/>
-  </p:clrMapOvr>
-  <mc:AlternateContent xmlns:mc="http://schemas.openxmlformats.org/markup-compatibility/2006" xmlns:p14="http://schemas.microsoft.com/office/powerpoint/2010/main">
-    <mc:Choice Requires="p14">
-      <p:transition p14:dur="10" advTm="0"/>
-    </mc:Choice>
-    <mc:Fallback xmlns="">
-      <p:transition advTm="0"/>
-    </mc:Fallback>
-  </mc:AlternateContent>
-</p:sld>
-</file>
-
 <file path=ppt/slides/slide2.xml><?xml version="1.0" encoding="utf-8"?>
 <p:sld xmlns:a="http://schemas.openxmlformats.org/drawingml/2006/main" xmlns:r="http://schemas.openxmlformats.org/officeDocument/2006/relationships" xmlns:p="http://schemas.openxmlformats.org/presentationml/2006/main">
   <p:cSld>
@@ -7270,7 +7011,7 @@
                 <a:latin typeface="黑体" panose="02010609060101010101" pitchFamily="49" charset="-122"/>
                 <a:cs typeface="+mn-ea"/>
               </a:rPr>
-              <a:t>itchat.login</a:t>
+              <a:t>itchat.auto_login</a:t>
             </a:r>
             <a:r>
               <a:rPr lang="en-US" altLang="zh-CN" sz="2000" dirty="0">
@@ -7758,1007 +7499,148 @@
           <a:chExt cx="0" cy="0"/>
         </a:xfrm>
       </p:grpSpPr>
-      <p:grpSp>
-        <p:nvGrpSpPr>
-          <p:cNvPr id="31" name="组合 30">
-            <a:extLst>
-              <a:ext uri="{FF2B5EF4-FFF2-40B4-BE49-F238E27FC236}">
-                <a16:creationId xmlns:a16="http://schemas.microsoft.com/office/drawing/2014/main" id="{B74A6A5B-7265-6746-8EDC-9B3CDE187409}"/>
-              </a:ext>
-            </a:extLst>
-          </p:cNvPr>
-          <p:cNvGrpSpPr/>
-          <p:nvPr/>
-        </p:nvGrpSpPr>
-        <p:grpSpPr>
-          <a:xfrm>
-            <a:off x="596727" y="472248"/>
-            <a:ext cx="5409245" cy="523220"/>
-            <a:chOff x="-4764" y="99435"/>
-            <a:chExt cx="5409245" cy="523220"/>
-          </a:xfrm>
-        </p:grpSpPr>
-        <p:sp>
-          <p:nvSpPr>
-            <p:cNvPr id="33" name="文本框 32">
-              <a:extLst>
-                <a:ext uri="{FF2B5EF4-FFF2-40B4-BE49-F238E27FC236}">
-                  <a16:creationId xmlns:a16="http://schemas.microsoft.com/office/drawing/2014/main" id="{DEE02059-6358-F94E-A16E-168FF82FB428}"/>
-                </a:ext>
-              </a:extLst>
-            </p:cNvPr>
-            <p:cNvSpPr txBox="1"/>
-            <p:nvPr/>
-          </p:nvSpPr>
-          <p:spPr>
-            <a:xfrm>
-              <a:off x="561019" y="99435"/>
-              <a:ext cx="4843462" cy="523220"/>
-            </a:xfrm>
-            <a:prstGeom prst="rect">
-              <a:avLst/>
-            </a:prstGeom>
-            <a:noFill/>
-          </p:spPr>
-          <p:txBody>
-            <a:bodyPr wrap="square" rtlCol="0">
-              <a:spAutoFit/>
-            </a:bodyPr>
-            <a:lstStyle/>
-            <a:p>
-              <a:r>
-                <a:rPr lang="zh-CN" altLang="en-US" sz="2800" dirty="0">
-                  <a:solidFill>
-                    <a:schemeClr val="accent1">
-                      <a:lumMod val="75000"/>
-                    </a:schemeClr>
-                  </a:solidFill>
-                  <a:latin typeface="黑体" panose="02010609060101010101" pitchFamily="49" charset="-122"/>
-                  <a:ea typeface="黑体" panose="02010609060101010101" pitchFamily="49" charset="-122"/>
-                  <a:cs typeface="+mn-ea"/>
-                  <a:sym typeface="+mn-lt"/>
-                </a:rPr>
-                <a:t>获取数据：</a:t>
-              </a:r>
-              <a:r>
-                <a:rPr lang="en-US" altLang="zh-CN" sz="2800" dirty="0" err="1">
-                  <a:solidFill>
-                    <a:schemeClr val="accent1">
-                      <a:lumMod val="75000"/>
-                    </a:schemeClr>
-                  </a:solidFill>
-                  <a:latin typeface="黑体" panose="02010609060101010101" pitchFamily="49" charset="-122"/>
-                  <a:ea typeface="黑体" panose="02010609060101010101" pitchFamily="49" charset="-122"/>
-                  <a:cs typeface="+mn-ea"/>
-                  <a:sym typeface="+mn-lt"/>
-                </a:rPr>
-                <a:t>itchat</a:t>
-              </a:r>
-              <a:r>
-                <a:rPr lang="zh-CN" altLang="en-US" sz="2800" dirty="0">
-                  <a:solidFill>
-                    <a:schemeClr val="accent1">
-                      <a:lumMod val="75000"/>
-                    </a:schemeClr>
-                  </a:solidFill>
-                  <a:latin typeface="黑体" panose="02010609060101010101" pitchFamily="49" charset="-122"/>
-                  <a:ea typeface="黑体" panose="02010609060101010101" pitchFamily="49" charset="-122"/>
-                  <a:cs typeface="+mn-ea"/>
-                  <a:sym typeface="+mn-lt"/>
-                </a:rPr>
-                <a:t>库</a:t>
-              </a:r>
-            </a:p>
-          </p:txBody>
-        </p:sp>
-        <p:grpSp>
-          <p:nvGrpSpPr>
-            <p:cNvPr id="34" name="组合 33">
-              <a:extLst>
-                <a:ext uri="{FF2B5EF4-FFF2-40B4-BE49-F238E27FC236}">
-                  <a16:creationId xmlns:a16="http://schemas.microsoft.com/office/drawing/2014/main" id="{3323A2BB-49C0-4747-9088-C4FFAA4FC1BE}"/>
-                </a:ext>
-              </a:extLst>
-            </p:cNvPr>
-            <p:cNvGrpSpPr/>
-            <p:nvPr/>
-          </p:nvGrpSpPr>
-          <p:grpSpPr>
-            <a:xfrm>
-              <a:off x="-4764" y="142875"/>
-              <a:ext cx="565783" cy="436341"/>
-              <a:chOff x="-4764" y="142875"/>
-              <a:chExt cx="565783" cy="436341"/>
-            </a:xfrm>
-          </p:grpSpPr>
-          <p:sp>
-            <p:nvSpPr>
-              <p:cNvPr id="35" name="矩形 34">
-                <a:extLst>
-                  <a:ext uri="{FF2B5EF4-FFF2-40B4-BE49-F238E27FC236}">
-                    <a16:creationId xmlns:a16="http://schemas.microsoft.com/office/drawing/2014/main" id="{522209D0-0671-EB4D-A889-DC7F8FAA036B}"/>
-                  </a:ext>
-                </a:extLst>
-              </p:cNvPr>
-              <p:cNvSpPr/>
-              <p:nvPr/>
-            </p:nvSpPr>
-            <p:spPr>
-              <a:xfrm>
-                <a:off x="442936" y="142875"/>
-                <a:ext cx="118083" cy="436341"/>
-              </a:xfrm>
-              <a:prstGeom prst="rect">
-                <a:avLst/>
-              </a:prstGeom>
-              <a:solidFill>
-                <a:schemeClr val="accent1">
-                  <a:lumMod val="75000"/>
-                </a:schemeClr>
-              </a:solidFill>
-              <a:ln>
-                <a:noFill/>
-              </a:ln>
-            </p:spPr>
-            <p:style>
-              <a:lnRef idx="2">
-                <a:schemeClr val="accent1">
-                  <a:shade val="50000"/>
-                </a:schemeClr>
-              </a:lnRef>
-              <a:fillRef idx="1">
-                <a:schemeClr val="accent1"/>
-              </a:fillRef>
-              <a:effectRef idx="0">
-                <a:schemeClr val="accent1"/>
-              </a:effectRef>
-              <a:fontRef idx="minor">
-                <a:schemeClr val="lt1"/>
-              </a:fontRef>
-            </p:style>
-            <p:txBody>
-              <a:bodyPr rtlCol="0" anchor="ctr"/>
-              <a:lstStyle/>
-              <a:p>
-                <a:pPr algn="ctr"/>
-                <a:endParaRPr lang="zh-CN" altLang="en-US">
-                  <a:solidFill>
-                    <a:schemeClr val="accent1">
-                      <a:lumMod val="75000"/>
-                    </a:schemeClr>
-                  </a:solidFill>
-                  <a:latin typeface="黑体" panose="02010609060101010101" pitchFamily="49" charset="-122"/>
-                  <a:ea typeface="黑体" panose="02010609060101010101" pitchFamily="49" charset="-122"/>
-                </a:endParaRPr>
-              </a:p>
-            </p:txBody>
-          </p:sp>
-          <p:sp>
-            <p:nvSpPr>
-              <p:cNvPr id="36" name="矩形 35">
-                <a:extLst>
-                  <a:ext uri="{FF2B5EF4-FFF2-40B4-BE49-F238E27FC236}">
-                    <a16:creationId xmlns:a16="http://schemas.microsoft.com/office/drawing/2014/main" id="{516B054F-F9CF-8E48-9030-8CCAFF520554}"/>
-                  </a:ext>
-                </a:extLst>
-              </p:cNvPr>
-              <p:cNvSpPr/>
-              <p:nvPr/>
-            </p:nvSpPr>
-            <p:spPr>
-              <a:xfrm>
-                <a:off x="-4764" y="142875"/>
-                <a:ext cx="360040" cy="436341"/>
-              </a:xfrm>
-              <a:prstGeom prst="rect">
-                <a:avLst/>
-              </a:prstGeom>
-              <a:solidFill>
-                <a:schemeClr val="accent1">
-                  <a:lumMod val="75000"/>
-                </a:schemeClr>
-              </a:solidFill>
-              <a:ln>
-                <a:noFill/>
-              </a:ln>
-            </p:spPr>
-            <p:style>
-              <a:lnRef idx="2">
-                <a:schemeClr val="accent1">
-                  <a:shade val="50000"/>
-                </a:schemeClr>
-              </a:lnRef>
-              <a:fillRef idx="1">
-                <a:schemeClr val="accent1"/>
-              </a:fillRef>
-              <a:effectRef idx="0">
-                <a:schemeClr val="accent1"/>
-              </a:effectRef>
-              <a:fontRef idx="minor">
-                <a:schemeClr val="lt1"/>
-              </a:fontRef>
-            </p:style>
-            <p:txBody>
-              <a:bodyPr rtlCol="0" anchor="ctr"/>
-              <a:lstStyle/>
-              <a:p>
-                <a:pPr algn="ctr"/>
-                <a:endParaRPr lang="zh-CN" altLang="en-US">
-                  <a:solidFill>
-                    <a:schemeClr val="accent1">
-                      <a:lumMod val="75000"/>
-                    </a:schemeClr>
-                  </a:solidFill>
-                  <a:latin typeface="黑体" panose="02010609060101010101" pitchFamily="49" charset="-122"/>
-                  <a:ea typeface="黑体" panose="02010609060101010101" pitchFamily="49" charset="-122"/>
-                </a:endParaRPr>
-              </a:p>
-            </p:txBody>
-          </p:sp>
-        </p:grpSp>
-      </p:grpSp>
       <p:sp>
         <p:nvSpPr>
-          <p:cNvPr id="11" name="Rectangle 26">
-            <a:extLst>
-              <a:ext uri="{FF2B5EF4-FFF2-40B4-BE49-F238E27FC236}">
-                <a16:creationId xmlns:a16="http://schemas.microsoft.com/office/drawing/2014/main" id="{7333FBA8-87E1-4110-A516-EA9615A2CAB9}"/>
-              </a:ext>
-            </a:extLst>
-          </p:cNvPr>
+          <p:cNvPr id="63" name="TextBox 10"/>
+          <p:cNvSpPr txBox="1"/>
+          <p:nvPr/>
+        </p:nvSpPr>
+        <p:spPr>
+          <a:xfrm>
+            <a:off x="3417022" y="5559540"/>
+            <a:ext cx="6024711" cy="900238"/>
+          </a:xfrm>
+          <a:prstGeom prst="rect">
+            <a:avLst/>
+          </a:prstGeom>
+          <a:noFill/>
+        </p:spPr>
+        <p:txBody>
+          <a:bodyPr wrap="none" lIns="68572" tIns="34286" rIns="68572" bIns="34286">
+            <a:spAutoFit/>
+          </a:bodyPr>
+          <a:lstStyle/>
+          <a:p>
+            <a:pPr algn="ctr">
+              <a:buNone/>
+            </a:pPr>
+            <a:r>
+              <a:rPr lang="zh-CN" altLang="en-US" sz="5400" dirty="0">
+                <a:solidFill>
+                  <a:schemeClr val="accent1"/>
+                </a:solidFill>
+                <a:latin typeface="黑体" panose="02010609060101010101" pitchFamily="49" charset="-122"/>
+                <a:ea typeface="黑体" panose="02010609060101010101" pitchFamily="49" charset="-122"/>
+                <a:cs typeface="Arial" panose="020B0604020202020204" pitchFamily="34" charset="0"/>
+              </a:rPr>
+              <a:t>感谢聆听 批评指导</a:t>
+            </a:r>
+          </a:p>
+        </p:txBody>
+      </p:sp>
+      <p:sp>
+        <p:nvSpPr>
+          <p:cNvPr id="71" name="矩形 70"/>
           <p:cNvSpPr/>
           <p:nvPr/>
         </p:nvSpPr>
         <p:spPr>
           <a:xfrm>
-            <a:off x="2157521" y="1187085"/>
-            <a:ext cx="10032494" cy="417654"/>
+            <a:off x="3945101" y="6496645"/>
+            <a:ext cx="4968552" cy="315463"/>
           </a:xfrm>
           <a:prstGeom prst="rect">
             <a:avLst/>
           </a:prstGeom>
         </p:spPr>
         <p:txBody>
-          <a:bodyPr wrap="square" lIns="96430" tIns="48216" rIns="96430" bIns="48216">
+          <a:bodyPr wrap="square" lIns="68572" tIns="34286" rIns="68572" bIns="34286">
             <a:spAutoFit/>
           </a:bodyPr>
           <a:lstStyle/>
           <a:p>
-            <a:pPr defTabSz="963930">
-              <a:lnSpc>
-                <a:spcPct val="120000"/>
-              </a:lnSpc>
-            </a:pPr>
-            <a:endParaRPr lang="en-US" altLang="zh-CN" sz="2000" dirty="0">
-              <a:solidFill>
-                <a:schemeClr val="accent1">
-                  <a:lumMod val="75000"/>
-                </a:schemeClr>
-              </a:solidFill>
-              <a:latin typeface="黑体" panose="02010609060101010101" pitchFamily="49" charset="-122"/>
-              <a:ea typeface="黑体" panose="02010609060101010101" pitchFamily="49" charset="-122"/>
-              <a:cs typeface="+mn-ea"/>
-            </a:endParaRPr>
+            <a:pPr algn="ctr"/>
+            <a:r>
+              <a:rPr lang="en-US" altLang="zh-CN" sz="1600" dirty="0">
+                <a:solidFill>
+                  <a:schemeClr val="accent1"/>
+                </a:solidFill>
+                <a:latin typeface="黑体" panose="02010609060101010101" pitchFamily="49" charset="-122"/>
+                <a:ea typeface="黑体" panose="02010609060101010101" pitchFamily="49" charset="-122"/>
+                <a:cs typeface="Arial" panose="020B0604020202020204" pitchFamily="34" charset="0"/>
+              </a:rPr>
+              <a:t>GENERAL EDUCATION TEACHING COURSEWARE</a:t>
+            </a:r>
           </a:p>
         </p:txBody>
       </p:sp>
-      <p:sp>
-        <p:nvSpPr>
-          <p:cNvPr id="10" name="Pentagon 33">
+      <p:pic>
+        <p:nvPicPr>
+          <p:cNvPr id="2" name="图片 1"/>
+          <p:cNvPicPr>
+            <a:picLocks noChangeAspect="1"/>
+          </p:cNvPicPr>
+          <p:nvPr/>
+        </p:nvPicPr>
+        <p:blipFill>
+          <a:blip r:embed="rId3">
             <a:extLst>
-              <a:ext uri="{FF2B5EF4-FFF2-40B4-BE49-F238E27FC236}">
-                <a16:creationId xmlns:a16="http://schemas.microsoft.com/office/drawing/2014/main" id="{DA1DAF3F-E9A5-4B29-BE83-30EC107D7AC5}"/>
+              <a:ext uri="{28A0092B-C50C-407E-A947-70E740481C1C}">
+                <a14:useLocalDpi xmlns:a14="http://schemas.microsoft.com/office/drawing/2010/main" val="0"/>
               </a:ext>
             </a:extLst>
-          </p:cNvPr>
-          <p:cNvSpPr/>
-          <p:nvPr/>
-        </p:nvSpPr>
+          </a:blip>
+          <a:stretch>
+            <a:fillRect/>
+          </a:stretch>
+        </p:blipFill>
         <p:spPr>
           <a:xfrm>
-            <a:off x="740743" y="1201725"/>
-            <a:ext cx="640667" cy="383982"/>
-          </a:xfrm>
-          <a:prstGeom prst="homePlate">
-            <a:avLst/>
-          </a:prstGeom>
-          <a:solidFill>
-            <a:schemeClr val="accent2"/>
-          </a:solidFill>
-          <a:ln w="28575">
-            <a:noFill/>
-          </a:ln>
-          <a:effectLst>
-            <a:outerShdw blurRad="88900" dist="75434" dir="2699985" rotWithShape="0">
-              <a:scrgbClr r="0" g="0" b="0">
-                <a:alpha val="23000"/>
-              </a:scrgbClr>
-            </a:outerShdw>
-          </a:effectLst>
-        </p:spPr>
-        <p:style>
-          <a:lnRef idx="2">
-            <a:schemeClr val="accent1">
-              <a:shade val="50000"/>
-            </a:schemeClr>
-          </a:lnRef>
-          <a:fillRef idx="1">
-            <a:schemeClr val="accent1"/>
-          </a:fillRef>
-          <a:effectRef idx="0">
-            <a:schemeClr val="accent1"/>
-          </a:effectRef>
-          <a:fontRef idx="minor">
-            <a:schemeClr val="lt1"/>
-          </a:fontRef>
-        </p:style>
-        <p:txBody>
-          <a:bodyPr lIns="96430" tIns="48216" rIns="96430" bIns="48216" rtlCol="0" anchor="ctr"/>
-          <a:lstStyle/>
-          <a:p>
-            <a:pPr algn="ctr">
-              <a:lnSpc>
-                <a:spcPct val="120000"/>
-              </a:lnSpc>
-            </a:pPr>
-            <a:endParaRPr lang="en-GB" sz="2110" dirty="0">
-              <a:solidFill>
-                <a:schemeClr val="accent1">
-                  <a:lumMod val="75000"/>
-                </a:schemeClr>
-              </a:solidFill>
-              <a:latin typeface="黑体" panose="02010609060101010101" pitchFamily="49" charset="-122"/>
-              <a:ea typeface="黑体" panose="02010609060101010101" pitchFamily="49" charset="-122"/>
-              <a:cs typeface="+mn-ea"/>
-              <a:sym typeface="Arial" panose="020B0604020202020204" pitchFamily="34" charset="0"/>
-            </a:endParaRPr>
-          </a:p>
-        </p:txBody>
-      </p:sp>
-      <p:sp>
-        <p:nvSpPr>
-          <p:cNvPr id="12" name="Rectangle 26">
-            <a:extLst>
-              <a:ext uri="{FF2B5EF4-FFF2-40B4-BE49-F238E27FC236}">
-                <a16:creationId xmlns:a16="http://schemas.microsoft.com/office/drawing/2014/main" id="{9AF06F24-0683-4DDF-B62F-165F88019CA2}"/>
-              </a:ext>
-            </a:extLst>
-          </p:cNvPr>
-          <p:cNvSpPr/>
-          <p:nvPr/>
-        </p:nvSpPr>
-        <p:spPr>
-          <a:xfrm>
-            <a:off x="1365433" y="1168053"/>
-            <a:ext cx="10032494" cy="4110973"/>
+            <a:off x="4629175" y="1121936"/>
+            <a:ext cx="4112444" cy="4112444"/>
           </a:xfrm>
           <a:prstGeom prst="rect">
             <a:avLst/>
           </a:prstGeom>
         </p:spPr>
-        <p:txBody>
-          <a:bodyPr wrap="square" lIns="96430" tIns="48216" rIns="96430" bIns="48216">
-            <a:spAutoFit/>
-          </a:bodyPr>
-          <a:lstStyle/>
-          <a:p>
-            <a:pPr marL="342900" indent="-342900" defTabSz="963930">
-              <a:lnSpc>
-                <a:spcPct val="120000"/>
-              </a:lnSpc>
-              <a:buFont typeface="Arial" panose="020B0604020202020204" pitchFamily="34" charset="0"/>
-              <a:buChar char="•"/>
-            </a:pPr>
-            <a:r>
-              <a:rPr lang="zh-CN" altLang="en-US" sz="2000" dirty="0">
-                <a:solidFill>
-                  <a:schemeClr val="accent1">
-                    <a:lumMod val="75000"/>
-                  </a:schemeClr>
-                </a:solidFill>
-                <a:latin typeface="黑体" panose="02010609060101010101" pitchFamily="49" charset="-122"/>
-                <a:cs typeface="+mn-ea"/>
-              </a:rPr>
-              <a:t>安装</a:t>
-            </a:r>
-            <a:r>
-              <a:rPr lang="en-US" altLang="zh-CN" sz="2000" dirty="0" err="1">
-                <a:solidFill>
-                  <a:schemeClr val="accent1">
-                    <a:lumMod val="75000"/>
-                  </a:schemeClr>
-                </a:solidFill>
-                <a:latin typeface="黑体" panose="02010609060101010101" pitchFamily="49" charset="-122"/>
-                <a:cs typeface="+mn-ea"/>
-              </a:rPr>
-              <a:t>itchat</a:t>
-            </a:r>
-            <a:r>
-              <a:rPr lang="zh-CN" altLang="en-US" sz="2000" dirty="0">
-                <a:solidFill>
-                  <a:schemeClr val="accent1">
-                    <a:lumMod val="75000"/>
-                  </a:schemeClr>
-                </a:solidFill>
-                <a:latin typeface="黑体" panose="02010609060101010101" pitchFamily="49" charset="-122"/>
-                <a:cs typeface="+mn-ea"/>
-              </a:rPr>
-              <a:t>库：</a:t>
-            </a:r>
-            <a:r>
-              <a:rPr lang="en-US" altLang="zh-CN" sz="2000" dirty="0">
-                <a:solidFill>
-                  <a:schemeClr val="accent1">
-                    <a:lumMod val="75000"/>
-                  </a:schemeClr>
-                </a:solidFill>
-                <a:latin typeface="黑体" panose="02010609060101010101" pitchFamily="49" charset="-122"/>
-                <a:cs typeface="+mn-ea"/>
-              </a:rPr>
-              <a:t>pip install </a:t>
-            </a:r>
-            <a:r>
-              <a:rPr lang="en-US" altLang="zh-CN" sz="2000" dirty="0" err="1">
-                <a:solidFill>
-                  <a:schemeClr val="accent1">
-                    <a:lumMod val="75000"/>
-                  </a:schemeClr>
-                </a:solidFill>
-                <a:latin typeface="黑体" panose="02010609060101010101" pitchFamily="49" charset="-122"/>
-                <a:cs typeface="+mn-ea"/>
-              </a:rPr>
-              <a:t>itchat</a:t>
-            </a:r>
-            <a:endParaRPr lang="en-US" altLang="zh-CN" sz="2000" dirty="0">
-              <a:solidFill>
-                <a:schemeClr val="accent1">
-                  <a:lumMod val="75000"/>
-                </a:schemeClr>
-              </a:solidFill>
-              <a:latin typeface="黑体" panose="02010609060101010101" pitchFamily="49" charset="-122"/>
-              <a:cs typeface="+mn-ea"/>
-            </a:endParaRPr>
-          </a:p>
-          <a:p>
-            <a:pPr marL="342900" indent="-342900" defTabSz="963930">
-              <a:lnSpc>
-                <a:spcPct val="120000"/>
-              </a:lnSpc>
-              <a:buFont typeface="Arial" panose="020B0604020202020204" pitchFamily="34" charset="0"/>
-              <a:buChar char="•"/>
-            </a:pPr>
-            <a:r>
-              <a:rPr lang="zh-CN" altLang="en-US" sz="2000" dirty="0">
-                <a:solidFill>
-                  <a:schemeClr val="accent1">
-                    <a:lumMod val="75000"/>
-                  </a:schemeClr>
-                </a:solidFill>
-                <a:latin typeface="黑体" panose="02010609060101010101" pitchFamily="49" charset="-122"/>
-                <a:cs typeface="+mn-ea"/>
-              </a:rPr>
-              <a:t>登录微信：</a:t>
-            </a:r>
-            <a:r>
-              <a:rPr lang="en-US" altLang="zh-CN" sz="2000" dirty="0" err="1">
-                <a:solidFill>
-                  <a:schemeClr val="accent1">
-                    <a:lumMod val="75000"/>
-                  </a:schemeClr>
-                </a:solidFill>
-                <a:latin typeface="黑体" panose="02010609060101010101" pitchFamily="49" charset="-122"/>
-                <a:cs typeface="+mn-ea"/>
-              </a:rPr>
-              <a:t>itchat.login</a:t>
-            </a:r>
-            <a:r>
-              <a:rPr lang="en-US" altLang="zh-CN" sz="2000" dirty="0">
-                <a:solidFill>
-                  <a:schemeClr val="accent1">
-                    <a:lumMod val="75000"/>
-                  </a:schemeClr>
-                </a:solidFill>
-                <a:latin typeface="黑体" panose="02010609060101010101" pitchFamily="49" charset="-122"/>
-                <a:cs typeface="+mn-ea"/>
-              </a:rPr>
-              <a:t>()</a:t>
-            </a:r>
-          </a:p>
-          <a:p>
-            <a:pPr marL="342900" indent="-342900" defTabSz="963930">
-              <a:lnSpc>
-                <a:spcPct val="120000"/>
-              </a:lnSpc>
-              <a:buFont typeface="Arial" panose="020B0604020202020204" pitchFamily="34" charset="0"/>
-              <a:buChar char="•"/>
-            </a:pPr>
-            <a:r>
-              <a:rPr lang="zh-CN" altLang="en-US" sz="2000" dirty="0">
-                <a:solidFill>
-                  <a:schemeClr val="accent1">
-                    <a:lumMod val="75000"/>
-                  </a:schemeClr>
-                </a:solidFill>
-                <a:latin typeface="黑体" panose="02010609060101010101" pitchFamily="49" charset="-122"/>
-                <a:cs typeface="+mn-ea"/>
-              </a:rPr>
-              <a:t>发送消息：</a:t>
-            </a:r>
-            <a:r>
-              <a:rPr lang="en-US" altLang="zh-CN" sz="2000" dirty="0" err="1">
-                <a:solidFill>
-                  <a:schemeClr val="accent1">
-                    <a:lumMod val="75000"/>
-                  </a:schemeClr>
-                </a:solidFill>
-                <a:latin typeface="黑体" panose="02010609060101010101" pitchFamily="49" charset="-122"/>
-                <a:cs typeface="+mn-ea"/>
-              </a:rPr>
-              <a:t>itchat.send</a:t>
-            </a:r>
-            <a:r>
-              <a:rPr lang="en-US" altLang="zh-CN" sz="2000" dirty="0">
-                <a:solidFill>
-                  <a:schemeClr val="accent1">
-                    <a:lumMod val="75000"/>
-                  </a:schemeClr>
-                </a:solidFill>
-                <a:latin typeface="黑体" panose="02010609060101010101" pitchFamily="49" charset="-122"/>
-                <a:cs typeface="+mn-ea"/>
-              </a:rPr>
-              <a:t>('Hello, </a:t>
-            </a:r>
-            <a:r>
-              <a:rPr lang="en-US" altLang="zh-CN" sz="2000" dirty="0" err="1">
-                <a:solidFill>
-                  <a:schemeClr val="accent1">
-                    <a:lumMod val="75000"/>
-                  </a:schemeClr>
-                </a:solidFill>
-                <a:latin typeface="黑体" panose="02010609060101010101" pitchFamily="49" charset="-122"/>
-                <a:cs typeface="+mn-ea"/>
-              </a:rPr>
-              <a:t>filehelper</a:t>
-            </a:r>
-            <a:r>
-              <a:rPr lang="en-US" altLang="zh-CN" sz="2000" dirty="0">
-                <a:solidFill>
-                  <a:schemeClr val="accent1">
-                    <a:lumMod val="75000"/>
-                  </a:schemeClr>
-                </a:solidFill>
-                <a:latin typeface="黑体" panose="02010609060101010101" pitchFamily="49" charset="-122"/>
-                <a:cs typeface="+mn-ea"/>
-              </a:rPr>
-              <a:t>', </a:t>
-            </a:r>
-            <a:r>
-              <a:rPr lang="en-US" altLang="zh-CN" sz="2000" dirty="0" err="1">
-                <a:solidFill>
-                  <a:schemeClr val="accent1">
-                    <a:lumMod val="75000"/>
-                  </a:schemeClr>
-                </a:solidFill>
-                <a:latin typeface="黑体" panose="02010609060101010101" pitchFamily="49" charset="-122"/>
-                <a:cs typeface="+mn-ea"/>
-              </a:rPr>
-              <a:t>toUserName</a:t>
-            </a:r>
-            <a:r>
-              <a:rPr lang="en-US" altLang="zh-CN" sz="2000" dirty="0">
-                <a:solidFill>
-                  <a:schemeClr val="accent1">
-                    <a:lumMod val="75000"/>
-                  </a:schemeClr>
-                </a:solidFill>
-                <a:latin typeface="黑体" panose="02010609060101010101" pitchFamily="49" charset="-122"/>
-                <a:cs typeface="+mn-ea"/>
-              </a:rPr>
-              <a:t>='</a:t>
-            </a:r>
-            <a:r>
-              <a:rPr lang="en-US" altLang="zh-CN" sz="2000" dirty="0" err="1">
-                <a:solidFill>
-                  <a:schemeClr val="accent1">
-                    <a:lumMod val="75000"/>
-                  </a:schemeClr>
-                </a:solidFill>
-                <a:latin typeface="黑体" panose="02010609060101010101" pitchFamily="49" charset="-122"/>
-                <a:cs typeface="+mn-ea"/>
-              </a:rPr>
-              <a:t>filehelper</a:t>
-            </a:r>
-            <a:r>
-              <a:rPr lang="en-US" altLang="zh-CN" sz="2000" dirty="0">
-                <a:solidFill>
-                  <a:schemeClr val="accent1">
-                    <a:lumMod val="75000"/>
-                  </a:schemeClr>
-                </a:solidFill>
-                <a:latin typeface="黑体" panose="02010609060101010101" pitchFamily="49" charset="-122"/>
-                <a:cs typeface="+mn-ea"/>
-              </a:rPr>
-              <a:t>’)</a:t>
-            </a:r>
-          </a:p>
-          <a:p>
-            <a:pPr marL="342900" indent="-342900" defTabSz="963930">
-              <a:lnSpc>
-                <a:spcPct val="120000"/>
-              </a:lnSpc>
-              <a:buFont typeface="Arial" panose="020B0604020202020204" pitchFamily="34" charset="0"/>
-              <a:buChar char="•"/>
-            </a:pPr>
-            <a:r>
-              <a:rPr lang="zh-CN" altLang="en-US" sz="2000" dirty="0">
-                <a:solidFill>
-                  <a:schemeClr val="accent1">
-                    <a:lumMod val="75000"/>
-                  </a:schemeClr>
-                </a:solidFill>
-                <a:latin typeface="黑体" panose="02010609060101010101" pitchFamily="49" charset="-122"/>
-                <a:cs typeface="+mn-ea"/>
-              </a:rPr>
-              <a:t>回复消息：</a:t>
-            </a:r>
-            <a:r>
-              <a:rPr lang="en-US" altLang="zh-CN" sz="2000" dirty="0">
-                <a:solidFill>
-                  <a:schemeClr val="accent1">
-                    <a:lumMod val="75000"/>
-                  </a:schemeClr>
-                </a:solidFill>
-                <a:latin typeface="黑体" panose="02010609060101010101" pitchFamily="49" charset="-122"/>
-                <a:cs typeface="+mn-ea"/>
-              </a:rPr>
-              <a:t>@</a:t>
-            </a:r>
-            <a:r>
-              <a:rPr lang="en-US" altLang="zh-CN" sz="2000" dirty="0" err="1">
-                <a:solidFill>
-                  <a:schemeClr val="accent1">
-                    <a:lumMod val="75000"/>
-                  </a:schemeClr>
-                </a:solidFill>
-                <a:latin typeface="黑体" panose="02010609060101010101" pitchFamily="49" charset="-122"/>
-                <a:cs typeface="+mn-ea"/>
-              </a:rPr>
-              <a:t>itchat.msg_register</a:t>
-            </a:r>
-            <a:r>
-              <a:rPr lang="en-US" altLang="zh-CN" sz="2000" dirty="0">
-                <a:solidFill>
-                  <a:schemeClr val="accent1">
-                    <a:lumMod val="75000"/>
-                  </a:schemeClr>
-                </a:solidFill>
-                <a:latin typeface="黑体" panose="02010609060101010101" pitchFamily="49" charset="-122"/>
-                <a:cs typeface="+mn-ea"/>
-              </a:rPr>
-              <a:t>(</a:t>
-            </a:r>
-            <a:r>
-              <a:rPr lang="en-US" altLang="zh-CN" sz="2000" dirty="0" err="1">
-                <a:solidFill>
-                  <a:schemeClr val="accent1">
-                    <a:lumMod val="75000"/>
-                  </a:schemeClr>
-                </a:solidFill>
-                <a:latin typeface="黑体" panose="02010609060101010101" pitchFamily="49" charset="-122"/>
-                <a:cs typeface="+mn-ea"/>
-              </a:rPr>
-              <a:t>itchat.content.TEXT</a:t>
-            </a:r>
-            <a:r>
-              <a:rPr lang="en-US" altLang="zh-CN" sz="2000" dirty="0">
-                <a:solidFill>
-                  <a:schemeClr val="accent1">
-                    <a:lumMod val="75000"/>
-                  </a:schemeClr>
-                </a:solidFill>
-                <a:latin typeface="黑体" panose="02010609060101010101" pitchFamily="49" charset="-122"/>
-                <a:cs typeface="+mn-ea"/>
-              </a:rPr>
-              <a:t>)</a:t>
-            </a:r>
-          </a:p>
-          <a:p>
-            <a:pPr marL="1625600" lvl="2" indent="-342900" defTabSz="963930">
-              <a:lnSpc>
-                <a:spcPct val="120000"/>
-              </a:lnSpc>
-              <a:buFont typeface="Arial" panose="020B0604020202020204" pitchFamily="34" charset="0"/>
-              <a:buChar char="•"/>
-            </a:pPr>
-            <a:r>
-              <a:rPr lang="en-US" altLang="zh-CN" sz="2000" dirty="0">
-                <a:solidFill>
-                  <a:schemeClr val="accent1">
-                    <a:lumMod val="75000"/>
-                  </a:schemeClr>
-                </a:solidFill>
-                <a:latin typeface="黑体" panose="02010609060101010101" pitchFamily="49" charset="-122"/>
-                <a:cs typeface="+mn-ea"/>
-              </a:rPr>
-              <a:t>def </a:t>
-            </a:r>
-            <a:r>
-              <a:rPr lang="en-US" altLang="zh-CN" sz="2000" dirty="0" err="1">
-                <a:solidFill>
-                  <a:schemeClr val="accent1">
-                    <a:lumMod val="75000"/>
-                  </a:schemeClr>
-                </a:solidFill>
-                <a:latin typeface="黑体" panose="02010609060101010101" pitchFamily="49" charset="-122"/>
-                <a:cs typeface="+mn-ea"/>
-              </a:rPr>
-              <a:t>text_reply</a:t>
-            </a:r>
-            <a:r>
-              <a:rPr lang="en-US" altLang="zh-CN" sz="2000" dirty="0">
-                <a:solidFill>
-                  <a:schemeClr val="accent1">
-                    <a:lumMod val="75000"/>
-                  </a:schemeClr>
-                </a:solidFill>
-                <a:latin typeface="黑体" panose="02010609060101010101" pitchFamily="49" charset="-122"/>
-                <a:cs typeface="+mn-ea"/>
-              </a:rPr>
-              <a:t>(msg):</a:t>
-            </a:r>
-          </a:p>
-          <a:p>
-            <a:pPr defTabSz="963930">
-              <a:lnSpc>
-                <a:spcPct val="120000"/>
-              </a:lnSpc>
-            </a:pPr>
-            <a:r>
-              <a:rPr lang="en-US" altLang="zh-CN" sz="2000" dirty="0">
-                <a:solidFill>
-                  <a:schemeClr val="accent1">
-                    <a:lumMod val="75000"/>
-                  </a:schemeClr>
-                </a:solidFill>
-                <a:latin typeface="黑体" panose="02010609060101010101" pitchFamily="49" charset="-122"/>
-                <a:cs typeface="+mn-ea"/>
-              </a:rPr>
-              <a:t>		return </a:t>
-            </a:r>
-            <a:r>
-              <a:rPr lang="en-US" altLang="zh-CN" sz="2000" dirty="0" err="1">
-                <a:solidFill>
-                  <a:schemeClr val="accent1">
-                    <a:lumMod val="75000"/>
-                  </a:schemeClr>
-                </a:solidFill>
-                <a:latin typeface="黑体" panose="02010609060101010101" pitchFamily="49" charset="-122"/>
-                <a:cs typeface="+mn-ea"/>
-              </a:rPr>
-              <a:t>msg.text</a:t>
-            </a:r>
-            <a:r>
-              <a:rPr lang="en-US" altLang="zh-CN" sz="2000" dirty="0">
-                <a:solidFill>
-                  <a:schemeClr val="accent1">
-                    <a:lumMod val="75000"/>
-                  </a:schemeClr>
-                </a:solidFill>
-                <a:latin typeface="黑体" panose="02010609060101010101" pitchFamily="49" charset="-122"/>
-                <a:cs typeface="+mn-ea"/>
-              </a:rPr>
-              <a:t>	</a:t>
-            </a:r>
-          </a:p>
-          <a:p>
-            <a:pPr marL="1625600" lvl="2" indent="-342900" defTabSz="963930">
-              <a:lnSpc>
-                <a:spcPct val="120000"/>
-              </a:lnSpc>
-              <a:buFont typeface="Arial" panose="020B0604020202020204" pitchFamily="34" charset="0"/>
-              <a:buChar char="•"/>
-            </a:pPr>
-            <a:r>
-              <a:rPr lang="en-US" altLang="zh-CN" sz="2000" dirty="0" err="1">
-                <a:solidFill>
-                  <a:schemeClr val="accent1">
-                    <a:lumMod val="75000"/>
-                  </a:schemeClr>
-                </a:solidFill>
-                <a:latin typeface="黑体" panose="02010609060101010101" pitchFamily="49" charset="-122"/>
-                <a:cs typeface="+mn-ea"/>
-              </a:rPr>
-              <a:t>itchat.auto_login</a:t>
-            </a:r>
-            <a:r>
-              <a:rPr lang="en-US" altLang="zh-CN" sz="2000" dirty="0">
-                <a:solidFill>
-                  <a:schemeClr val="accent1">
-                    <a:lumMod val="75000"/>
-                  </a:schemeClr>
-                </a:solidFill>
-                <a:latin typeface="黑体" panose="02010609060101010101" pitchFamily="49" charset="-122"/>
-                <a:cs typeface="+mn-ea"/>
-              </a:rPr>
-              <a:t>()</a:t>
-            </a:r>
-          </a:p>
-          <a:p>
-            <a:pPr marL="1625600" lvl="2" indent="-342900" defTabSz="963930">
-              <a:lnSpc>
-                <a:spcPct val="120000"/>
-              </a:lnSpc>
-              <a:buFont typeface="Arial" panose="020B0604020202020204" pitchFamily="34" charset="0"/>
-              <a:buChar char="•"/>
-            </a:pPr>
-            <a:r>
-              <a:rPr lang="en-US" altLang="zh-CN" sz="2000" dirty="0" err="1">
-                <a:solidFill>
-                  <a:schemeClr val="accent1">
-                    <a:lumMod val="75000"/>
-                  </a:schemeClr>
-                </a:solidFill>
-                <a:latin typeface="黑体" panose="02010609060101010101" pitchFamily="49" charset="-122"/>
-                <a:cs typeface="+mn-ea"/>
-              </a:rPr>
-              <a:t>itchat.run</a:t>
-            </a:r>
-            <a:r>
-              <a:rPr lang="en-US" altLang="zh-CN" sz="2000" dirty="0">
-                <a:solidFill>
-                  <a:schemeClr val="accent1">
-                    <a:lumMod val="75000"/>
-                  </a:schemeClr>
-                </a:solidFill>
-                <a:latin typeface="黑体" panose="02010609060101010101" pitchFamily="49" charset="-122"/>
-                <a:cs typeface="+mn-ea"/>
-              </a:rPr>
-              <a:t>()</a:t>
-            </a:r>
-          </a:p>
-          <a:p>
-            <a:pPr marL="342900" indent="-342900" defTabSz="963930">
-              <a:lnSpc>
-                <a:spcPct val="120000"/>
-              </a:lnSpc>
-              <a:buFont typeface="Arial" panose="020B0604020202020204" pitchFamily="34" charset="0"/>
-              <a:buChar char="•"/>
-            </a:pPr>
-            <a:r>
-              <a:rPr lang="zh-CN" altLang="en-US" sz="2000" dirty="0">
-                <a:solidFill>
-                  <a:schemeClr val="accent1">
-                    <a:lumMod val="75000"/>
-                  </a:schemeClr>
-                </a:solidFill>
-                <a:latin typeface="黑体" panose="02010609060101010101" pitchFamily="49" charset="-122"/>
-                <a:cs typeface="+mn-ea"/>
-              </a:rPr>
-              <a:t>消息类型：</a:t>
-            </a:r>
-            <a:r>
-              <a:rPr lang="en-US" altLang="zh-CN" sz="2000" dirty="0">
-                <a:solidFill>
-                  <a:schemeClr val="accent1">
-                    <a:lumMod val="75000"/>
-                  </a:schemeClr>
-                </a:solidFill>
-                <a:latin typeface="黑体" panose="02010609060101010101" pitchFamily="49" charset="-122"/>
-                <a:cs typeface="+mn-ea"/>
-              </a:rPr>
-              <a:t>TEXT, MAP, CARD, NOTE, SHARING</a:t>
-            </a:r>
-            <a:r>
-              <a:rPr lang="zh-CN" altLang="en-US" sz="2000" dirty="0">
-                <a:solidFill>
-                  <a:schemeClr val="accent1">
-                    <a:lumMod val="75000"/>
-                  </a:schemeClr>
-                </a:solidFill>
-                <a:latin typeface="黑体" panose="02010609060101010101" pitchFamily="49" charset="-122"/>
-                <a:cs typeface="+mn-ea"/>
-              </a:rPr>
-              <a:t>、</a:t>
-            </a:r>
-            <a:r>
-              <a:rPr lang="en-US" altLang="zh-CN" sz="2000" dirty="0">
-                <a:solidFill>
-                  <a:schemeClr val="accent1">
-                    <a:lumMod val="75000"/>
-                  </a:schemeClr>
-                </a:solidFill>
-                <a:latin typeface="黑体" panose="02010609060101010101" pitchFamily="49" charset="-122"/>
-                <a:cs typeface="+mn-ea"/>
-              </a:rPr>
-              <a:t>PICTURE, RECORDING, ATTACHMENT, VIDEO</a:t>
-            </a:r>
-            <a:r>
-              <a:rPr lang="zh-CN" altLang="en-US" sz="2000" dirty="0">
-                <a:solidFill>
-                  <a:schemeClr val="accent1">
-                    <a:lumMod val="75000"/>
-                  </a:schemeClr>
-                </a:solidFill>
-                <a:latin typeface="黑体" panose="02010609060101010101" pitchFamily="49" charset="-122"/>
-                <a:cs typeface="+mn-ea"/>
-              </a:rPr>
-              <a:t>、</a:t>
-            </a:r>
-            <a:r>
-              <a:rPr lang="en-US" altLang="zh-CN" sz="2000" dirty="0">
-                <a:solidFill>
-                  <a:schemeClr val="accent1">
-                    <a:lumMod val="75000"/>
-                  </a:schemeClr>
-                </a:solidFill>
-                <a:latin typeface="黑体" panose="02010609060101010101" pitchFamily="49" charset="-122"/>
-                <a:cs typeface="+mn-ea"/>
-              </a:rPr>
-              <a:t>FRIENDS</a:t>
-            </a:r>
-          </a:p>
-          <a:p>
-            <a:pPr marL="342900" indent="-342900" defTabSz="963930">
-              <a:lnSpc>
-                <a:spcPct val="120000"/>
-              </a:lnSpc>
-              <a:buFont typeface="Arial" panose="020B0604020202020204" pitchFamily="34" charset="0"/>
-              <a:buChar char="•"/>
-            </a:pPr>
-            <a:r>
-              <a:rPr lang="zh-CN" altLang="en-US" sz="2000" dirty="0">
-                <a:solidFill>
-                  <a:schemeClr val="accent1">
-                    <a:lumMod val="75000"/>
-                  </a:schemeClr>
-                </a:solidFill>
-                <a:latin typeface="黑体" panose="02010609060101010101" pitchFamily="49" charset="-122"/>
-                <a:cs typeface="+mn-ea"/>
-              </a:rPr>
-              <a:t>获取好友信息：</a:t>
-            </a:r>
-            <a:r>
-              <a:rPr lang="en-US" altLang="zh-CN" sz="2000" dirty="0" err="1">
-                <a:solidFill>
-                  <a:schemeClr val="accent1">
-                    <a:lumMod val="75000"/>
-                  </a:schemeClr>
-                </a:solidFill>
-                <a:latin typeface="黑体" panose="02010609060101010101" pitchFamily="49" charset="-122"/>
-                <a:cs typeface="+mn-ea"/>
-              </a:rPr>
-              <a:t>itchat.get_friends</a:t>
-            </a:r>
-            <a:r>
-              <a:rPr lang="en-US" altLang="zh-CN" sz="2000">
-                <a:solidFill>
-                  <a:schemeClr val="accent1">
-                    <a:lumMod val="75000"/>
-                  </a:schemeClr>
-                </a:solidFill>
-                <a:latin typeface="黑体" panose="02010609060101010101" pitchFamily="49" charset="-122"/>
-                <a:cs typeface="+mn-ea"/>
-              </a:rPr>
-              <a:t>(update=True)</a:t>
-            </a:r>
-            <a:endParaRPr lang="en-US" altLang="zh-CN" sz="2000" dirty="0">
-              <a:solidFill>
-                <a:schemeClr val="accent1">
-                  <a:lumMod val="75000"/>
-                </a:schemeClr>
-              </a:solidFill>
-              <a:latin typeface="黑体" panose="02010609060101010101" pitchFamily="49" charset="-122"/>
-              <a:cs typeface="+mn-ea"/>
-            </a:endParaRPr>
-          </a:p>
-        </p:txBody>
-      </p:sp>
+      </p:pic>
+      <p:pic>
+        <p:nvPicPr>
+          <p:cNvPr id="4" name="图片 3" descr="卡通人物&#10;&#10;描述已自动生成">
+            <a:extLst>
+              <a:ext uri="{FF2B5EF4-FFF2-40B4-BE49-F238E27FC236}">
+                <a16:creationId xmlns:a16="http://schemas.microsoft.com/office/drawing/2014/main" id="{789E5A49-9892-4544-BCAD-5420FF1F9833}"/>
+              </a:ext>
+            </a:extLst>
+          </p:cNvPr>
+          <p:cNvPicPr>
+            <a:picLocks noChangeAspect="1"/>
+          </p:cNvPicPr>
+          <p:nvPr/>
+        </p:nvPicPr>
+        <p:blipFill>
+          <a:blip r:embed="rId4">
+            <a:extLst>
+              <a:ext uri="{28A0092B-C50C-407E-A947-70E740481C1C}">
+                <a14:useLocalDpi xmlns:a14="http://schemas.microsoft.com/office/drawing/2010/main" val="0"/>
+              </a:ext>
+            </a:extLst>
+          </a:blip>
+          <a:stretch>
+            <a:fillRect/>
+          </a:stretch>
+        </p:blipFill>
+        <p:spPr>
+          <a:xfrm>
+            <a:off x="0" y="87927"/>
+            <a:ext cx="12858750" cy="7056796"/>
+          </a:xfrm>
+          <a:prstGeom prst="rect">
+            <a:avLst/>
+          </a:prstGeom>
+        </p:spPr>
+      </p:pic>
     </p:spTree>
-    <p:extLst>
-      <p:ext uri="{BB962C8B-B14F-4D97-AF65-F5344CB8AC3E}">
-        <p14:creationId xmlns:p14="http://schemas.microsoft.com/office/powerpoint/2010/main" val="3439644080"/>
-      </p:ext>
-    </p:extLst>
   </p:cSld>
   <p:clrMapOvr>
     <a:masterClrMapping/>

</xml_diff>